<commit_message>
✨ NEW Focus on some repeaters
</commit_message>
<xml_diff>
--- a/docs/slides/andersen_2023/slides.pptx
+++ b/docs/slides/andersen_2023/slides.pptx
@@ -4,9 +4,6 @@
   <p:sldMasterIdLst>
     <p:sldMasterId id="2147483648" r:id="rId1"/>
   </p:sldMasterIdLst>
-  <p:notesMasterIdLst>
-    <p:notesMasterId r:id="rId19"/>
-  </p:notesMasterIdLst>
   <p:sldIdLst>
     <p:sldId id="256" r:id="rId2"/>
     <p:sldId id="257" r:id="rId3"/>
@@ -140,437 +137,6 @@
     </p:ext>
   </p:extLst>
 </p:presentation>
-</file>
-
-<file path=ppt/notesMasters/notesMaster1.xml><?xml version="1.0" encoding="utf-8"?>
-<p:notesMaster xmlns:a="http://schemas.openxmlformats.org/drawingml/2006/main" xmlns:r="http://schemas.openxmlformats.org/officeDocument/2006/relationships" xmlns:p="http://schemas.openxmlformats.org/presentationml/2006/main">
-  <p:cSld>
-    <p:bg>
-      <p:bgRef idx="1001">
-        <a:schemeClr val="bg1"/>
-      </p:bgRef>
-    </p:bg>
-    <p:spTree>
-      <p:nvGrpSpPr>
-        <p:cNvPr id="1" name=""/>
-        <p:cNvGrpSpPr/>
-        <p:nvPr/>
-      </p:nvGrpSpPr>
-      <p:grpSpPr>
-        <a:xfrm>
-          <a:off x="0" y="0"/>
-          <a:ext cx="0" cy="0"/>
-          <a:chOff x="0" y="0"/>
-          <a:chExt cx="0" cy="0"/>
-        </a:xfrm>
-      </p:grpSpPr>
-      <p:sp>
-        <p:nvSpPr>
-          <p:cNvPr id="2" name="Header Placeholder 1"/>
-          <p:cNvSpPr>
-            <a:spLocks noGrp="1"/>
-          </p:cNvSpPr>
-          <p:nvPr>
-            <p:ph type="hdr" sz="quarter"/>
-          </p:nvPr>
-        </p:nvSpPr>
-        <p:spPr>
-          <a:xfrm>
-            <a:off x="0" y="0"/>
-            <a:ext cx="2971800" cy="458788"/>
-          </a:xfrm>
-          <a:prstGeom prst="rect">
-            <a:avLst/>
-          </a:prstGeom>
-        </p:spPr>
-        <p:txBody>
-          <a:bodyPr vert="horz" lIns="91440" tIns="45720" rIns="91440" bIns="45720" rtlCol="0"/>
-          <a:lstStyle>
-            <a:lvl1pPr algn="l">
-              <a:defRPr sz="1200"/>
-            </a:lvl1pPr>
-          </a:lstStyle>
-          <a:p>
-            <a:endParaRPr lang="en-US"/>
-          </a:p>
-        </p:txBody>
-      </p:sp>
-      <p:sp>
-        <p:nvSpPr>
-          <p:cNvPr id="3" name="Date Placeholder 2"/>
-          <p:cNvSpPr>
-            <a:spLocks noGrp="1"/>
-          </p:cNvSpPr>
-          <p:nvPr>
-            <p:ph type="dt" idx="1"/>
-          </p:nvPr>
-        </p:nvSpPr>
-        <p:spPr>
-          <a:xfrm>
-            <a:off x="3884613" y="0"/>
-            <a:ext cx="2971800" cy="458788"/>
-          </a:xfrm>
-          <a:prstGeom prst="rect">
-            <a:avLst/>
-          </a:prstGeom>
-        </p:spPr>
-        <p:txBody>
-          <a:bodyPr vert="horz" lIns="91440" tIns="45720" rIns="91440" bIns="45720" rtlCol="0"/>
-          <a:lstStyle>
-            <a:lvl1pPr algn="r">
-              <a:defRPr sz="1200"/>
-            </a:lvl1pPr>
-          </a:lstStyle>
-          <a:p>
-            <a:fld id="{0F9C1CCF-B725-44A7-AA57-5E433BD85C9F}" type="datetimeFigureOut">
-              <a:rPr lang="en-US" smtClean="0"/>
-              <a:t>1/2/22</a:t>
-            </a:fld>
-            <a:endParaRPr lang="en-US"/>
-          </a:p>
-        </p:txBody>
-      </p:sp>
-      <p:sp>
-        <p:nvSpPr>
-          <p:cNvPr id="4" name="Slide Image Placeholder 3"/>
-          <p:cNvSpPr>
-            <a:spLocks noGrp="1" noRot="1" noChangeAspect="1"/>
-          </p:cNvSpPr>
-          <p:nvPr>
-            <p:ph type="sldImg" idx="2"/>
-          </p:nvPr>
-        </p:nvSpPr>
-        <p:spPr>
-          <a:xfrm>
-            <a:off x="685800" y="1143000"/>
-            <a:ext cx="5486400" cy="3086100"/>
-          </a:xfrm>
-          <a:prstGeom prst="rect">
-            <a:avLst/>
-          </a:prstGeom>
-          <a:noFill/>
-          <a:ln w="12700">
-            <a:solidFill>
-              <a:prstClr val="black"/>
-            </a:solidFill>
-          </a:ln>
-        </p:spPr>
-        <p:txBody>
-          <a:bodyPr vert="horz" lIns="91440" tIns="45720" rIns="91440" bIns="45720" rtlCol="0" anchor="ctr"/>
-          <a:lstStyle/>
-          <a:p>
-            <a:endParaRPr lang="en-US"/>
-          </a:p>
-        </p:txBody>
-      </p:sp>
-      <p:sp>
-        <p:nvSpPr>
-          <p:cNvPr id="5" name="Notes Placeholder 4"/>
-          <p:cNvSpPr>
-            <a:spLocks noGrp="1"/>
-          </p:cNvSpPr>
-          <p:nvPr>
-            <p:ph type="body" sz="quarter" idx="3"/>
-          </p:nvPr>
-        </p:nvSpPr>
-        <p:spPr>
-          <a:xfrm>
-            <a:off x="685800" y="4400550"/>
-            <a:ext cx="5486400" cy="3600450"/>
-          </a:xfrm>
-          <a:prstGeom prst="rect">
-            <a:avLst/>
-          </a:prstGeom>
-        </p:spPr>
-        <p:txBody>
-          <a:bodyPr vert="horz" lIns="91440" tIns="45720" rIns="91440" bIns="45720" rtlCol="0"/>
-          <a:lstStyle/>
-          <a:p>
-            <a:pPr lvl="0"/>
-            <a:r>
-              <a:rPr lang="en-US"/>
-              <a:t>Click to edit Master text styles</a:t>
-            </a:r>
-          </a:p>
-          <a:p>
-            <a:pPr lvl="1"/>
-            <a:r>
-              <a:rPr lang="en-US"/>
-              <a:t>Second level</a:t>
-            </a:r>
-          </a:p>
-          <a:p>
-            <a:pPr lvl="2"/>
-            <a:r>
-              <a:rPr lang="en-US"/>
-              <a:t>Third level</a:t>
-            </a:r>
-          </a:p>
-          <a:p>
-            <a:pPr lvl="3"/>
-            <a:r>
-              <a:rPr lang="en-US"/>
-              <a:t>Fourth level</a:t>
-            </a:r>
-          </a:p>
-          <a:p>
-            <a:pPr lvl="4"/>
-            <a:r>
-              <a:rPr lang="en-US"/>
-              <a:t>Fifth level</a:t>
-            </a:r>
-          </a:p>
-        </p:txBody>
-      </p:sp>
-      <p:sp>
-        <p:nvSpPr>
-          <p:cNvPr id="6" name="Footer Placeholder 5"/>
-          <p:cNvSpPr>
-            <a:spLocks noGrp="1"/>
-          </p:cNvSpPr>
-          <p:nvPr>
-            <p:ph type="ftr" sz="quarter" idx="4"/>
-          </p:nvPr>
-        </p:nvSpPr>
-        <p:spPr>
-          <a:xfrm>
-            <a:off x="0" y="8685213"/>
-            <a:ext cx="2971800" cy="458787"/>
-          </a:xfrm>
-          <a:prstGeom prst="rect">
-            <a:avLst/>
-          </a:prstGeom>
-        </p:spPr>
-        <p:txBody>
-          <a:bodyPr vert="horz" lIns="91440" tIns="45720" rIns="91440" bIns="45720" rtlCol="0" anchor="b"/>
-          <a:lstStyle>
-            <a:lvl1pPr algn="l">
-              <a:defRPr sz="1200"/>
-            </a:lvl1pPr>
-          </a:lstStyle>
-          <a:p>
-            <a:endParaRPr lang="en-US"/>
-          </a:p>
-        </p:txBody>
-      </p:sp>
-      <p:sp>
-        <p:nvSpPr>
-          <p:cNvPr id="7" name="Slide Number Placeholder 6"/>
-          <p:cNvSpPr>
-            <a:spLocks noGrp="1"/>
-          </p:cNvSpPr>
-          <p:nvPr>
-            <p:ph type="sldNum" sz="quarter" idx="5"/>
-          </p:nvPr>
-        </p:nvSpPr>
-        <p:spPr>
-          <a:xfrm>
-            <a:off x="3884613" y="8685213"/>
-            <a:ext cx="2971800" cy="458787"/>
-          </a:xfrm>
-          <a:prstGeom prst="rect">
-            <a:avLst/>
-          </a:prstGeom>
-        </p:spPr>
-        <p:txBody>
-          <a:bodyPr vert="horz" lIns="91440" tIns="45720" rIns="91440" bIns="45720" rtlCol="0" anchor="b"/>
-          <a:lstStyle>
-            <a:lvl1pPr algn="r">
-              <a:defRPr sz="1200"/>
-            </a:lvl1pPr>
-          </a:lstStyle>
-          <a:p>
-            <a:fld id="{18BDFEC3-8487-43E8-A154-7C12CBC1FFF2}" type="slidenum">
-              <a:rPr lang="en-US" smtClean="0"/>
-              <a:t>‹#›</a:t>
-            </a:fld>
-            <a:endParaRPr lang="en-US"/>
-          </a:p>
-        </p:txBody>
-      </p:sp>
-    </p:spTree>
-    <p:extLst>
-      <p:ext uri="{BB962C8B-B14F-4D97-AF65-F5344CB8AC3E}">
-        <p14:creationId xmlns:p14="http://schemas.microsoft.com/office/powerpoint/2010/main" val="3782709779"/>
-      </p:ext>
-    </p:extLst>
-  </p:cSld>
-  <p:clrMap bg1="lt1" tx1="dk1" bg2="lt2" tx2="dk2" accent1="accent1" accent2="accent2" accent3="accent3" accent4="accent4" accent5="accent5" accent6="accent6" hlink="hlink" folHlink="folHlink"/>
-  <p:notesStyle>
-    <a:lvl1pPr marL="0" algn="l" defTabSz="914400" rtl="0" eaLnBrk="1" latinLnBrk="0" hangingPunct="1">
-      <a:defRPr sz="1200" kern="1200">
-        <a:solidFill>
-          <a:schemeClr val="tx1"/>
-        </a:solidFill>
-        <a:latin typeface="+mn-lt"/>
-        <a:ea typeface="+mn-ea"/>
-        <a:cs typeface="+mn-cs"/>
-      </a:defRPr>
-    </a:lvl1pPr>
-    <a:lvl2pPr marL="457200" algn="l" defTabSz="914400" rtl="0" eaLnBrk="1" latinLnBrk="0" hangingPunct="1">
-      <a:defRPr sz="1200" kern="1200">
-        <a:solidFill>
-          <a:schemeClr val="tx1"/>
-        </a:solidFill>
-        <a:latin typeface="+mn-lt"/>
-        <a:ea typeface="+mn-ea"/>
-        <a:cs typeface="+mn-cs"/>
-      </a:defRPr>
-    </a:lvl2pPr>
-    <a:lvl3pPr marL="914400" algn="l" defTabSz="914400" rtl="0" eaLnBrk="1" latinLnBrk="0" hangingPunct="1">
-      <a:defRPr sz="1200" kern="1200">
-        <a:solidFill>
-          <a:schemeClr val="tx1"/>
-        </a:solidFill>
-        <a:latin typeface="+mn-lt"/>
-        <a:ea typeface="+mn-ea"/>
-        <a:cs typeface="+mn-cs"/>
-      </a:defRPr>
-    </a:lvl3pPr>
-    <a:lvl4pPr marL="1371600" algn="l" defTabSz="914400" rtl="0" eaLnBrk="1" latinLnBrk="0" hangingPunct="1">
-      <a:defRPr sz="1200" kern="1200">
-        <a:solidFill>
-          <a:schemeClr val="tx1"/>
-        </a:solidFill>
-        <a:latin typeface="+mn-lt"/>
-        <a:ea typeface="+mn-ea"/>
-        <a:cs typeface="+mn-cs"/>
-      </a:defRPr>
-    </a:lvl4pPr>
-    <a:lvl5pPr marL="1828800" algn="l" defTabSz="914400" rtl="0" eaLnBrk="1" latinLnBrk="0" hangingPunct="1">
-      <a:defRPr sz="1200" kern="1200">
-        <a:solidFill>
-          <a:schemeClr val="tx1"/>
-        </a:solidFill>
-        <a:latin typeface="+mn-lt"/>
-        <a:ea typeface="+mn-ea"/>
-        <a:cs typeface="+mn-cs"/>
-      </a:defRPr>
-    </a:lvl5pPr>
-    <a:lvl6pPr marL="2286000" algn="l" defTabSz="914400" rtl="0" eaLnBrk="1" latinLnBrk="0" hangingPunct="1">
-      <a:defRPr sz="1200" kern="1200">
-        <a:solidFill>
-          <a:schemeClr val="tx1"/>
-        </a:solidFill>
-        <a:latin typeface="+mn-lt"/>
-        <a:ea typeface="+mn-ea"/>
-        <a:cs typeface="+mn-cs"/>
-      </a:defRPr>
-    </a:lvl6pPr>
-    <a:lvl7pPr marL="2743200" algn="l" defTabSz="914400" rtl="0" eaLnBrk="1" latinLnBrk="0" hangingPunct="1">
-      <a:defRPr sz="1200" kern="1200">
-        <a:solidFill>
-          <a:schemeClr val="tx1"/>
-        </a:solidFill>
-        <a:latin typeface="+mn-lt"/>
-        <a:ea typeface="+mn-ea"/>
-        <a:cs typeface="+mn-cs"/>
-      </a:defRPr>
-    </a:lvl7pPr>
-    <a:lvl8pPr marL="3200400" algn="l" defTabSz="914400" rtl="0" eaLnBrk="1" latinLnBrk="0" hangingPunct="1">
-      <a:defRPr sz="1200" kern="1200">
-        <a:solidFill>
-          <a:schemeClr val="tx1"/>
-        </a:solidFill>
-        <a:latin typeface="+mn-lt"/>
-        <a:ea typeface="+mn-ea"/>
-        <a:cs typeface="+mn-cs"/>
-      </a:defRPr>
-    </a:lvl8pPr>
-    <a:lvl9pPr marL="3657600" algn="l" defTabSz="914400" rtl="0" eaLnBrk="1" latinLnBrk="0" hangingPunct="1">
-      <a:defRPr sz="1200" kern="1200">
-        <a:solidFill>
-          <a:schemeClr val="tx1"/>
-        </a:solidFill>
-        <a:latin typeface="+mn-lt"/>
-        <a:ea typeface="+mn-ea"/>
-        <a:cs typeface="+mn-cs"/>
-      </a:defRPr>
-    </a:lvl9pPr>
-  </p:notesStyle>
-</p:notesMaster>
-</file>
-
-<file path=ppt/notesSlides/notesSlide1.xml><?xml version="1.0" encoding="utf-8"?>
-<p:notes xmlns:a="http://schemas.openxmlformats.org/drawingml/2006/main" xmlns:r="http://schemas.openxmlformats.org/officeDocument/2006/relationships" xmlns:p="http://schemas.openxmlformats.org/presentationml/2006/main">
-  <p:cSld>
-    <p:spTree>
-      <p:nvGrpSpPr>
-        <p:cNvPr id="1" name=""/>
-        <p:cNvGrpSpPr/>
-        <p:nvPr/>
-      </p:nvGrpSpPr>
-      <p:grpSpPr>
-        <a:xfrm>
-          <a:off x="0" y="0"/>
-          <a:ext cx="0" cy="0"/>
-          <a:chOff x="0" y="0"/>
-          <a:chExt cx="0" cy="0"/>
-        </a:xfrm>
-      </p:grpSpPr>
-      <p:sp>
-        <p:nvSpPr>
-          <p:cNvPr id="2" name="Slide Image Placeholder 1"/>
-          <p:cNvSpPr>
-            <a:spLocks noGrp="1" noRot="1" noChangeAspect="1"/>
-          </p:cNvSpPr>
-          <p:nvPr>
-            <p:ph type="sldImg"/>
-          </p:nvPr>
-        </p:nvSpPr>
-        <p:spPr/>
-      </p:sp>
-      <p:sp>
-        <p:nvSpPr>
-          <p:cNvPr id="3" name="Notes Placeholder 2"/>
-          <p:cNvSpPr>
-            <a:spLocks noGrp="1"/>
-          </p:cNvSpPr>
-          <p:nvPr>
-            <p:ph type="body" idx="1"/>
-          </p:nvPr>
-        </p:nvSpPr>
-        <p:spPr/>
-        <p:txBody>
-          <a:bodyPr/>
-          <a:lstStyle/>
-          <a:p>
-            <a:pPr lvl="0" indent="0" marL="0">
-              <a:buNone/>
-            </a:pPr>
-            <a:r>
-              <a:rPr/>
-              <a:t>For comparison, we have also added the CHIME/FRBdetected burst from SGR 1935+2154 to Figure 3. The two observed components for this burst clearly have different spectra, with the first peaking at the bottom of the CHIME band and the second at the top. This results in an upward drift of the frequency centers. The two components are separated by ∼29 ms and could be independent bursts rather than subbursts of the same envelope (CHIME/FRB Collaboration et al. 2020b). This burst thus seems to be an outlier among the FRBs in Catalog 1, and its morphology is not standard for repeating FRBs. It should be noted, however, that this magnetar burst had exceptionally large observed flux density owing to its proximity and that for a lot of more distant FRBs a second (or nth) component might be buried in the noise.</a:t>
-            </a:r>
-          </a:p>
-        </p:txBody>
-      </p:sp>
-      <p:sp>
-        <p:nvSpPr>
-          <p:cNvPr id="4" name="Slide Number Placeholder 3"/>
-          <p:cNvSpPr>
-            <a:spLocks noGrp="1"/>
-          </p:cNvSpPr>
-          <p:nvPr>
-            <p:ph type="sldNum" sz="quarter" idx="10"/>
-          </p:nvPr>
-        </p:nvSpPr>
-        <p:spPr/>
-        <p:txBody>
-          <a:bodyPr/>
-          <a:lstStyle/>
-          <a:p>
-            <a:fld id="{18BDFEC3-8487-43E8-A154-7C12CBC1FFF2}" type="slidenum">
-              <a:rPr lang="en-US"/>
-              <a:t>9</a:t>
-            </a:fld>
-            <a:endParaRPr lang="en-US"/>
-          </a:p>
-        </p:txBody>
-      </p:sp>
-    </p:spTree>
-  </p:cSld>
-</p:notes>
 </file>
 
 <file path=ppt/slideLayouts/slideLayout1.xml><?xml version="1.0" encoding="utf-8"?>
@@ -3565,7 +3131,7 @@
             </a:pPr>
             <a:r>
               <a:rPr/>
-              <a:t>Fast Radio Burst Morphology in the First CHIME/FRB Catalog</a:t>
+              <a:t>CHIME/FRB Discovery of 25 Repeating Fast Radio Burst Sources</a:t>
             </a:r>
           </a:p>
         </p:txBody>
@@ -3593,13 +3159,17 @@
             <a:pPr lvl="0" indent="0" marL="0">
               <a:buNone/>
             </a:pPr>
-            <a:br/>
-            <a:br/>
             <a:r>
               <a:rPr>
                 <a:hlinkClick r:id="rId2"/>
               </a:rPr>
-              <a:t>Pleunis, Z. et. al. (2021)</a:t>
+              <a:t>https://dx.doi.org/10.3847/1538-4357/ac33ac</a:t>
+            </a:r>
+            <a:br/>
+            <a:br/>
+            <a:r>
+              <a:rPr/>
+              <a:t>B. C. Andersen. et. al. (2023)</a:t>
             </a:r>
           </a:p>
         </p:txBody>
@@ -3646,67 +3216,51 @@
             </a:pPr>
             <a:r>
               <a:rPr/>
-              <a:t>Prediction</a:t>
-            </a:r>
-          </a:p>
-        </p:txBody>
-      </p:sp>
-      <p:pic>
-        <p:nvPicPr>
-          <p:cNvPr descr="fig:  ./figures/pleunis-separation-prediction.jpg" id="0" name="Picture 1"/>
-          <p:cNvPicPr>
-            <a:picLocks noGrp="1" noChangeAspect="1"/>
-          </p:cNvPicPr>
-          <p:nvPr/>
-        </p:nvPicPr>
-        <p:blipFill>
-          <a:blip r:embed="rId2"/>
-          <a:stretch>
-            <a:fillRect/>
-          </a:stretch>
-        </p:blipFill>
-        <p:spPr bwMode="auto">
-          <a:xfrm>
-            <a:off x="1689100" y="1193800"/>
-            <a:ext cx="5765800" cy="2882900"/>
-          </a:xfrm>
-          <a:prstGeom prst="rect">
-            <a:avLst/>
-          </a:prstGeom>
-          <a:noFill/>
-          <a:ln w="9525">
-            <a:noFill/>
-            <a:headEnd/>
-            <a:tailEnd/>
-          </a:ln>
-        </p:spPr>
-      </p:pic>
-      <p:sp>
-        <p:nvSpPr>
-          <p:cNvPr id="1" name="TextBox 3"/>
-          <p:cNvSpPr txBox="1"/>
-          <p:nvPr/>
-        </p:nvSpPr>
-        <p:spPr>
-          <a:xfrm>
-            <a:off x="457200" y="4076700"/>
-            <a:ext cx="8229600" cy="508000"/>
-          </a:xfrm>
-          <a:prstGeom prst="rect">
-            <a:avLst/>
-          </a:prstGeom>
-          <a:noFill/>
-        </p:spPr>
-        <p:txBody>
-          <a:bodyPr/>
-          <a:lstStyle/>
-          <a:p>
-            <a:pPr lvl="0" indent="0" marL="0" algn="ctr">
-              <a:buNone/>
-            </a:pPr>
+              <a:t>Analysis</a:t>
+            </a:r>
+          </a:p>
+        </p:txBody>
+      </p:sp>
+      <p:sp>
+        <p:nvSpPr>
+          <p:cNvPr id="3" name="Content Placeholder 2"/>
+          <p:cNvSpPr>
+            <a:spLocks noGrp="1"/>
+          </p:cNvSpPr>
+          <p:nvPr>
+            <p:ph idx="1"/>
+          </p:nvPr>
+        </p:nvSpPr>
+        <p:spPr/>
+        <p:txBody>
+          <a:bodyPr/>
+          <a:lstStyle/>
+          <a:p>
+            <a:pPr lvl="0"/>
             <a:r>
               <a:rPr/>
-              <a:t>Figure 4: Subburst pair separation in frequency and source exposure (in the CHIME/FRB upper transit). Pairs of subbursts from one-off events (green/gray filled diamonds) and repeater bursts (orange/gray open circles) are shown. Multiple pairs of subbursts associated with the same event are linked with vertical lines. Nongray markers indicate narrowband pairs (bandwidth &lt; 300 MHz). A source with a Poisson burst rate of 0.05 hr−1 (gray dotted line)—roughly the lowest observed rate for a CHIME/FRB repeater (Fonseca et al. 2020)—is expected to burst at least twice (i.e., is observed to repeat) in 40 hr. A one-off event with &gt;40 hr of exposure would thus have been detected as a repeater if the source were as prolific as the known repeaters. Repeater candidates are identified with open purple diamonds.</a:t>
+              <a:t>Most repeater bursts show narrow bandwidths of typically 50–200 MHz.</a:t>
+            </a:r>
+          </a:p>
+          <a:p>
+            <a:pPr lvl="0"/>
+            <a:r>
+              <a:rPr/>
+              <a:t>Some sources showing bursts with clear cases of downward–drifting subbursts, consistent with Pleunis et al. (2021).</a:t>
+            </a:r>
+          </a:p>
+          <a:p>
+            <a:pPr lvl="0"/>
+            <a:r>
+              <a:rPr/>
+              <a:t>Repeaters have consistently lower DM compared to non-repeaters.</a:t>
+            </a:r>
+          </a:p>
+          <a:p>
+            <a:pPr lvl="0"/>
+            <a:r>
+              <a:rPr/>
+              <a:t>Repeater show no significant difference in flux.</a:t>
             </a:r>
           </a:p>
         </p:txBody>
@@ -3743,7 +3297,12 @@
             <p:ph type="title"/>
           </p:nvPr>
         </p:nvSpPr>
-        <p:spPr/>
+        <p:spPr>
+          <a:xfrm>
+            <a:off x="457201" y="204787"/>
+            <a:ext cx="3008313" cy="871538"/>
+          </a:xfrm>
+        </p:spPr>
         <p:txBody>
           <a:bodyPr/>
           <a:lstStyle/>
@@ -3753,14 +3312,37 @@
             </a:pPr>
             <a:r>
               <a:rPr/>
-              <a:t>Prediction</a:t>
+              <a:t>Repeater Fraction</a:t>
+            </a:r>
+          </a:p>
+        </p:txBody>
+      </p:sp>
+      <p:sp>
+        <p:nvSpPr>
+          <p:cNvPr id="4" name="Text Placeholder 3"/>
+          <p:cNvSpPr>
+            <a:spLocks noGrp="1"/>
+          </p:cNvSpPr>
+          <p:nvPr>
+            <p:ph idx="2" sz="half" type="body"/>
+          </p:nvPr>
+        </p:nvSpPr>
+        <p:spPr/>
+        <p:txBody>
+          <a:bodyPr/>
+          <a:lstStyle/>
+          <a:p>
+            <a:pPr lvl="0"/>
+            <a:r>
+              <a:rPr/>
+              <a:t>By dividing the sky into 6 declination bins, they found that the repeater fraction tends to an equilibrium of 2.6%.</a:t>
             </a:r>
           </a:p>
         </p:txBody>
       </p:sp>
       <p:pic>
         <p:nvPicPr>
-          <p:cNvPr descr="./figures/pleunis-table-prediction.png" id="0" name="Picture 1"/>
+          <p:cNvPr descr="./figures/repeater-fraction.png" id="0" name="Picture 1"/>
           <p:cNvPicPr>
             <a:picLocks noGrp="1" noChangeAspect="1"/>
           </p:cNvPicPr>
@@ -3774,8 +3356,8 @@
         </p:blipFill>
         <p:spPr bwMode="auto">
           <a:xfrm>
-            <a:off x="1587500" y="1193800"/>
-            <a:ext cx="5969000" cy="3390900"/>
+            <a:off x="3568700" y="1358900"/>
+            <a:ext cx="5105400" cy="2070100"/>
           </a:xfrm>
           <a:prstGeom prst="rect">
             <a:avLst/>
@@ -3835,31 +3417,96 @@
           </a:p>
         </p:txBody>
       </p:sp>
-      <p:sp>
-        <p:nvSpPr>
-          <p:cNvPr id="3" name="Content Placeholder 2"/>
-          <p:cNvSpPr>
-            <a:spLocks noGrp="1"/>
-          </p:cNvSpPr>
-          <p:nvPr>
-            <p:ph idx="1"/>
-          </p:nvPr>
-        </p:nvSpPr>
-        <p:spPr/>
-        <p:txBody>
-          <a:bodyPr/>
-          <a:lstStyle/>
-          <a:p>
-            <a:pPr lvl="0" indent="0" marL="1270000">
-              <a:buNone/>
-            </a:pPr>
-            <a:r>
-              <a:rPr sz="2000"/>
-              <a:t>Our results show that FRBs can be probabilistically classified as either a one-off event or a repeater burst, based on only their burst morphologies.</a:t>
-            </a:r>
-          </a:p>
-        </p:txBody>
-      </p:sp>
+      <mc:AlternateContent xmlns:mc="http://schemas.openxmlformats.org/markup-compatibility/2006">
+        <mc:Choice xmlns:a14="http://schemas.microsoft.com/office/drawing/2010/main" Requires="a14">
+          <p:sp>
+            <p:nvSpPr>
+              <p:cNvPr id="3" name="Content Placeholder 2"/>
+              <p:cNvSpPr>
+                <a:spLocks noGrp="1"/>
+              </p:cNvSpPr>
+              <p:nvPr>
+                <p:ph idx="1"/>
+              </p:nvPr>
+            </p:nvSpPr>
+            <p:spPr/>
+            <p:txBody>
+              <a:bodyPr/>
+              <a:lstStyle/>
+              <a:p>
+                <a:pPr lvl="0" indent="-342900" marL="342900">
+                  <a:buAutoNum type="arabicPeriod"/>
+                </a:pPr>
+                <a:r>
+                  <a:rPr/>
+                  <a:t>A combination of clustering algorithm and contamination rate calculation found 25 new repeaters and 14 candidate repeaters.</a:t>
+                </a:r>
+              </a:p>
+              <a:p>
+                <a:pPr lvl="0" indent="-342900" marL="342900">
+                  <a:buAutoNum type="arabicPeriod"/>
+                </a:pPr>
+                <a:r>
+                  <a:rPr/>
+                  <a:t>Repeaters have consistently lower DM from non-repeaters.</a:t>
+                </a:r>
+              </a:p>
+              <a:p>
+                <a:pPr lvl="0" indent="-342900" marL="342900">
+                  <a:buAutoNum type="arabicPeriod"/>
+                </a:pPr>
+                <a:r>
+                  <a:rPr/>
+                  <a:t>Repeater fraction tends to an equilibrium of </a:t>
+                </a:r>
+                <a14:m>
+                  <m:oMath xmlns:m="http://schemas.openxmlformats.org/officeDocument/2006/math">
+                    <m:sSubSup>
+                      <m:e>
+                        <m:r>
+                          <m:t>2.6</m:t>
+                        </m:r>
+                      </m:e>
+                      <m:sub>
+                        <m:r>
+                          <m:rPr>
+                            <m:sty m:val="p"/>
+                          </m:rPr>
+                          <m:t>−</m:t>
+                        </m:r>
+                        <m:r>
+                          <m:t>2.6</m:t>
+                        </m:r>
+                      </m:sub>
+                      <m:sup>
+                        <m:r>
+                          <m:rPr>
+                            <m:sty m:val="p"/>
+                          </m:rPr>
+                          <m:t>+</m:t>
+                        </m:r>
+                        <m:r>
+                          <m:t>2.9</m:t>
+                        </m:r>
+                      </m:sup>
+                    </m:sSubSup>
+                    <m:r>
+                      <m:rPr>
+                        <m:sty m:val="p"/>
+                      </m:rPr>
+                      <m:t>%</m:t>
+                    </m:r>
+                  </m:oMath>
+                </a14:m>
+                <a:r>
+                  <a:rPr/>
+                  <a:t> over time.</a:t>
+                </a:r>
+              </a:p>
+            </p:txBody>
+          </p:sp>
+        </mc:Choice>
+      </mc:AlternateContent>
     </p:spTree>
   </p:cSld>
 </p:sld>
@@ -3892,7 +3539,12 @@
             <p:ph type="title"/>
           </p:nvPr>
         </p:nvSpPr>
-        <p:spPr/>
+        <p:spPr>
+          <a:xfrm>
+            <a:off x="722313" y="3305176"/>
+            <a:ext cx="7772400" cy="1021556"/>
+          </a:xfrm>
+        </p:spPr>
         <p:txBody>
           <a:bodyPr/>
           <a:lstStyle/>
@@ -3902,131 +3554,7 @@
             </a:pPr>
             <a:r>
               <a:rPr/>
-              <a:t>References</a:t>
-            </a:r>
-          </a:p>
-        </p:txBody>
-      </p:sp>
-      <p:sp>
-        <p:nvSpPr>
-          <p:cNvPr id="3" name="Content Placeholder 2"/>
-          <p:cNvSpPr>
-            <a:spLocks noGrp="1"/>
-          </p:cNvSpPr>
-          <p:nvPr>
-            <p:ph idx="1"/>
-          </p:nvPr>
-        </p:nvSpPr>
-        <p:spPr/>
-        <p:txBody>
-          <a:bodyPr/>
-          <a:lstStyle/>
-          <a:p>
-            <a:pPr lvl="0" indent="0" marL="0">
-              <a:buNone/>
-            </a:pPr>
-            <a:r>
-              <a:rPr/>
-              <a:t>Farah, W., C. Flynn, M. Bailes, A. Jameson, K. W. Bannister, E. D. Barr, T. Bateman, et al. 2018. “FRB Microstructure Revealed by the Real-Time Detection of FRB170827.” </a:t>
-            </a:r>
-            <a:r>
-              <a:rPr i="1"/>
-              <a:t>Monthly Notices of the Royal Astronomical Society</a:t>
-            </a:r>
-            <a:r>
-              <a:rPr/>
-              <a:t> 478 (July): 1209–17. </a:t>
-            </a:r>
-            <a:r>
-              <a:rPr>
-                <a:hlinkClick r:id="rId2"/>
-              </a:rPr>
-              <a:t>https://doi.org/10.1093/mnras/sty1122</a:t>
-            </a:r>
-            <a:r>
-              <a:rPr/>
-              <a:t>.</a:t>
-            </a:r>
-          </a:p>
-          <a:p>
-            <a:pPr lvl="0" indent="0" marL="0">
-              <a:buNone/>
-            </a:pPr>
-            <a:r>
-              <a:rPr/>
-              <a:t>Fonseca, E., B. C. Andersen, M. Bhardwaj, P. Chawla, D. C. Good, A. Josephy, V. M. Kaspi, et al. 2020. “Nine New Repeating Fast Radio Burst Sources from CHIME/FRB.” </a:t>
-            </a:r>
-            <a:r>
-              <a:rPr i="1"/>
-              <a:t>The Astrophysical Journal Letters</a:t>
-            </a:r>
-            <a:r>
-              <a:rPr/>
-              <a:t> 891 (1): L6. </a:t>
-            </a:r>
-            <a:r>
-              <a:rPr>
-                <a:hlinkClick r:id="rId3"/>
-              </a:rPr>
-              <a:t>https://doi.org/10.3847/2041-8213/ab7208</a:t>
-            </a:r>
-            <a:r>
-              <a:rPr/>
-              <a:t>.</a:t>
-            </a:r>
-          </a:p>
-          <a:p>
-            <a:pPr lvl="0" indent="0" marL="0">
-              <a:buNone/>
-            </a:pPr>
-            <a:r>
-              <a:rPr/>
-              <a:t>Gajjar, V., A. P. V. Siemion, D. C. Price, C. J. Law, D. Michilli, J. W. T. Hessels, S. Chatterjee, et al. 2018. “Highest Frequency Detection of FRB 121102 at 4-8 GHz Using the Breakthrough Listen Digital Backend at the Green Bank Telescope.” </a:t>
-            </a:r>
-            <a:r>
-              <a:rPr i="1"/>
-              <a:t>The Astrophysical Journal</a:t>
-            </a:r>
-            <a:r>
-              <a:rPr/>
-              <a:t> 863 (August): 2. </a:t>
-            </a:r>
-            <a:r>
-              <a:rPr>
-                <a:hlinkClick r:id="rId4"/>
-              </a:rPr>
-              <a:t>https://doi.org/10.3847/1538-4357/aad005</a:t>
-            </a:r>
-            <a:r>
-              <a:rPr/>
-              <a:t>.</a:t>
-            </a:r>
-          </a:p>
-          <a:p>
-            <a:pPr lvl="0" indent="0" marL="0">
-              <a:buNone/>
-            </a:pPr>
-            <a:r>
-              <a:rPr/>
-              <a:t>Hessels, J. W. T., L. G. Spitler, A. D. Seymour, J. M. Cordes, D. Michilli, R. S. Lynch, K. Gourdji, et al. 2019. “FRB 121102 Bursts Show Complex Time-Frequency Structure.” </a:t>
-            </a:r>
-            <a:r>
-              <a:rPr i="1"/>
-              <a:t>The Astrophysical Journal</a:t>
-            </a:r>
-            <a:r>
-              <a:rPr/>
-              <a:t> 876 (May): L23. </a:t>
-            </a:r>
-            <a:r>
-              <a:rPr>
-                <a:hlinkClick r:id="rId5"/>
-              </a:rPr>
-              <a:t>https://doi.org/10.3847/2041-8213/ab13ae</a:t>
-            </a:r>
-            <a:r>
-              <a:rPr/>
-              <a:t>.</a:t>
+              <a:t>Thank You</a:t>
             </a:r>
           </a:p>
         </p:txBody>
@@ -4063,12 +3591,7 @@
             <p:ph type="title"/>
           </p:nvPr>
         </p:nvSpPr>
-        <p:spPr>
-          <a:xfrm>
-            <a:off x="722313" y="3305176"/>
-            <a:ext cx="7772400" cy="1021556"/>
-          </a:xfrm>
-        </p:spPr>
+        <p:spPr/>
         <p:txBody>
           <a:bodyPr/>
           <a:lstStyle/>
@@ -4078,7 +3601,67 @@
             </a:pPr>
             <a:r>
               <a:rPr/>
-              <a:t>Thank You</a:t>
+              <a:t>References</a:t>
+            </a:r>
+          </a:p>
+        </p:txBody>
+      </p:sp>
+      <p:sp>
+        <p:nvSpPr>
+          <p:cNvPr id="3" name="Content Placeholder 2"/>
+          <p:cNvSpPr>
+            <a:spLocks noGrp="1"/>
+          </p:cNvSpPr>
+          <p:nvPr>
+            <p:ph idx="1"/>
+          </p:nvPr>
+        </p:nvSpPr>
+        <p:spPr/>
+        <p:txBody>
+          <a:bodyPr/>
+          <a:lstStyle/>
+          <a:p>
+            <a:pPr lvl="0" indent="0" marL="0">
+              <a:buNone/>
+            </a:pPr>
+            <a:r>
+              <a:rPr/>
+              <a:t>Ester, M., H. Kriegel, J. Sander, and Xiaowei Xu. 1996. “A Density-Based Algorithm for Discovering Clusters in Large Spatial Databases with Noise.” In </a:t>
+            </a:r>
+            <a:r>
+              <a:rPr i="1"/>
+              <a:t>Knowledge Discovery and Data Mining</a:t>
+            </a:r>
+            <a:r>
+              <a:rPr/>
+              <a:t>.</a:t>
+            </a:r>
+          </a:p>
+          <a:p>
+            <a:pPr lvl="0" indent="0" marL="0">
+              <a:buNone/>
+            </a:pPr>
+            <a:r>
+              <a:rPr/>
+              <a:t>Pleunis, Ziggy, Deborah C. Good, Victoria M. Kaspi, Ryan Mckinven, Scott M. Ransom, Paul Scholz, Kevin Bandura, et al. 2021. “Fast Radio Burst Morphology in the First CHIME/FRB Catalog.” </a:t>
+            </a:r>
+            <a:r>
+              <a:rPr i="1"/>
+              <a:t>The Astrophysical Journal</a:t>
+            </a:r>
+            <a:r>
+              <a:rPr/>
+              <a:t> 923 (1): 1. </a:t>
+            </a:r>
+            <a:r>
+              <a:rPr>
+                <a:hlinkClick r:id="rId2"/>
+              </a:rPr>
+              <a:t>https://doi.org/10.3847/1538-4357/ac33ac</a:t>
+            </a:r>
+            <a:r>
+              <a:rPr/>
+              <a:t>.</a:t>
             </a:r>
           </a:p>
         </p:txBody>
@@ -4202,7 +3785,7 @@
             </a:pPr>
             <a:r>
               <a:rPr/>
-              <a:t>Publication Report</a:t>
+              <a:t>Progress Report</a:t>
             </a:r>
           </a:p>
         </p:txBody>
@@ -4234,7 +3817,23 @@
             <a:pPr lvl="1"/>
             <a:r>
               <a:rPr/>
-              <a:t>Status: Data Analysis (Expect to finish by the end of March and write report by April)</a:t>
+              <a:t>Status: Calculation of Parameters for the new repeaters</a:t>
+            </a:r>
+          </a:p>
+          <a:p>
+            <a:pPr lvl="0" indent="-342900" marL="342900">
+              <a:buAutoNum type="arabicPeriod"/>
+            </a:pPr>
+            <a:r>
+              <a:rPr/>
+              <a:t>BURSTT Collaboration</a:t>
+            </a:r>
+          </a:p>
+          <a:p>
+            <a:pPr lvl="1"/>
+            <a:r>
+              <a:rPr/>
+              <a:t>Status: Early communication with Taiwan team</a:t>
             </a:r>
           </a:p>
         </p:txBody>
@@ -4306,16 +3905,7 @@
             </a:pPr>
             <a:r>
               <a:rPr sz="1800"/>
-              <a:t>1. See, for example: Gajjar et al. (2018), Hessels et al. (2019), Farah et al. (2018)</a:t>
-            </a:r>
-          </a:p>
-          <a:p>
-            <a:pPr lvl="0" indent="0" marL="0">
-              <a:buNone/>
-            </a:pPr>
-            <a:r>
-              <a:rPr sz="1800"/>
-              <a:t>2. the percentages are estimated by eye</a:t>
+              <a:t>1. Density–Based Spatial Clustering of Applications with Noise, Ester et al. (1996)</a:t>
             </a:r>
           </a:p>
         </p:txBody>
@@ -4352,12 +3942,7 @@
             <p:ph type="title"/>
           </p:nvPr>
         </p:nvSpPr>
-        <p:spPr>
-          <a:xfrm>
-            <a:off x="722313" y="3305176"/>
-            <a:ext cx="7772400" cy="1021556"/>
-          </a:xfrm>
-        </p:spPr>
+        <p:spPr/>
         <p:txBody>
           <a:bodyPr/>
           <a:lstStyle/>
@@ -4367,7 +3952,55 @@
             </a:pPr>
             <a:r>
               <a:rPr/>
-              <a:t>Introduction</a:t>
+              <a:t>Data Source</a:t>
+            </a:r>
+          </a:p>
+        </p:txBody>
+      </p:sp>
+      <p:sp>
+        <p:nvSpPr>
+          <p:cNvPr id="3" name="Content Placeholder 2"/>
+          <p:cNvSpPr>
+            <a:spLocks noGrp="1"/>
+          </p:cNvSpPr>
+          <p:nvPr>
+            <p:ph idx="1"/>
+          </p:nvPr>
+        </p:nvSpPr>
+        <p:spPr/>
+        <p:txBody>
+          <a:bodyPr/>
+          <a:lstStyle/>
+          <a:p>
+            <a:pPr lvl="0"/>
+            <a:r>
+              <a:rPr/>
+              <a:t>Detected between 30 Sept 2019 - 01 May 2021.</a:t>
+            </a:r>
+          </a:p>
+          <a:p>
+            <a:pPr lvl="0"/>
+            <a:r>
+              <a:rPr/>
+              <a:t>Dispersion Measure (DM) ranging from ~220 to ~1700 pc cm</a:t>
+            </a:r>
+            <a:r>
+              <a:rPr baseline="30000"/>
+              <a:t>-3</a:t>
+            </a:r>
+          </a:p>
+          <a:p>
+            <a:pPr lvl="0"/>
+            <a:r>
+              <a:rPr/>
+              <a:t>Signal-to-Noise Ratio (SNR) &gt; 8.5</a:t>
+            </a:r>
+          </a:p>
+          <a:p>
+            <a:pPr lvl="0"/>
+            <a:r>
+              <a:rPr/>
+              <a:t>Frequency between 400 MHz - 800 MHz</a:t>
             </a:r>
           </a:p>
         </p:txBody>
@@ -4380,20 +4013,6 @@
 <file path=ppt/slides/slide3.xml><?xml version="1.0" encoding="utf-8"?>
 <p:sld xmlns:a="http://schemas.openxmlformats.org/drawingml/2006/main" xmlns:r="http://schemas.openxmlformats.org/officeDocument/2006/relationships" xmlns:p="http://schemas.openxmlformats.org/presentationml/2006/main">
   <p:cSld>
-    <p:bg>
-      <p:bgPr>
-        <a:blipFill dpi="0" rotWithShape="1">
-          <a:blip r:embed="rId2">
-            <a:lum/>
-          </a:blip>
-          <a:srcRect/>
-          <a:stretch>
-            <a:fillRect t="-35000" b="-35000"/>
-          </a:stretch>
-        </a:blipFill>
-        <a:effectsLst/>
-      </p:bgPr>
-    </p:bg>
     <p:spTree>
       <p:nvGrpSpPr>
         <p:cNvPr id="1" name=""/>
@@ -4428,7 +4047,7 @@
             </a:pPr>
             <a:r>
               <a:rPr/>
-              <a:t>Meaning</a:t>
+              <a:t>Method: Identifying Repeaters</a:t>
             </a:r>
           </a:p>
         </p:txBody>
@@ -4448,21 +4067,21 @@
           <a:bodyPr/>
           <a:lstStyle/>
           <a:p>
-            <a:pPr lvl="0" indent="0" marL="0">
-              <a:buNone/>
+            <a:pPr lvl="0" indent="-342900" marL="342900">
+              <a:buAutoNum type="arabicPeriod"/>
             </a:pPr>
             <a:r>
-              <a:rPr b="1"/>
-              <a:t>Burst morphology</a:t>
-            </a:r>
-          </a:p>
-          <a:p>
-            <a:pPr lvl="0" indent="0" marL="1270000">
-              <a:buNone/>
+              <a:rPr/>
+              <a:t>Clustering Algorithm</a:t>
+            </a:r>
+          </a:p>
+          <a:p>
+            <a:pPr lvl="0" indent="-342900" marL="342900">
+              <a:buAutoNum type="arabicPeriod"/>
             </a:pPr>
             <a:r>
-              <a:rPr sz="2000"/>
-              <a:t>the change in flux as a function of time and frequency</a:t>
+              <a:rPr/>
+              <a:t>Contamination Rate</a:t>
             </a:r>
           </a:p>
         </p:txBody>
@@ -4509,7 +4128,7 @@
             </a:pPr>
             <a:r>
               <a:rPr/>
-              <a:t>Motivation</a:t>
+              <a:t>Method: Identifying Repeaters</a:t>
             </a:r>
           </a:p>
         </p:txBody>
@@ -4529,21 +4148,29 @@
           <a:bodyPr/>
           <a:lstStyle/>
           <a:p>
-            <a:pPr lvl="0" indent="0" marL="1270000">
+            <a:pPr lvl="0" indent="0" marL="0">
+              <a:spcBef>
+                <a:spcPts val="3000"/>
+              </a:spcBef>
               <a:buNone/>
             </a:pPr>
             <a:r>
-              <a:rPr sz="2000"/>
-              <a:t>FRBs show a variety of morphologies, and there are apparent differences between the appearance of oneoff events and repeater bursts.</a:t>
-            </a:r>
-          </a:p>
-          <a:p>
-            <a:pPr lvl="0" indent="0" marL="0">
-              <a:buNone/>
-            </a:pPr>
+              <a:rPr b="1"/>
+              <a:t>Clustering Algorithm</a:t>
+            </a:r>
+          </a:p>
+          <a:p>
+            <a:pPr lvl="0"/>
             <a:r>
               <a:rPr/>
-              <a:t>Many papers</a:t>
+              <a:t>Sources with similar RA, DEC, and DM likely come from the same source.</a:t>
+            </a:r>
+          </a:p>
+          <a:p>
+            <a:pPr lvl="0"/>
+            <a:r>
+              <a:rPr/>
+              <a:t>They used DBSCAN</a:t>
             </a:r>
             <a:r>
               <a:rPr baseline="30000">
@@ -4553,16 +4180,7 @@
             </a:r>
             <a:r>
               <a:rPr/>
-              <a:t> have studied FRB morphology of singular or small sample; with different telescope sources.</a:t>
-            </a:r>
-          </a:p>
-          <a:p>
-            <a:pPr lvl="0" indent="0" marL="0">
-              <a:buNone/>
-            </a:pPr>
-            <a:r>
-              <a:rPr/>
-              <a:t>The creation of the CHIME/FRB catalog allows for the systematic study of a wide array of morphology with consistent telescope dependent factors.</a:t>
+              <a:t> to identify points with similar values in the three measures mentioned.</a:t>
             </a:r>
           </a:p>
         </p:txBody>
@@ -4573,137 +4191,6 @@
 </file>
 
 <file path=ppt/slides/slide5.xml><?xml version="1.0" encoding="utf-8"?>
-<p:sld xmlns:a="http://schemas.openxmlformats.org/drawingml/2006/main" xmlns:r="http://schemas.openxmlformats.org/officeDocument/2006/relationships" xmlns:p="http://schemas.openxmlformats.org/presentationml/2006/main">
-  <p:cSld>
-    <p:bg>
-      <p:bgPr>
-        <a:blipFill dpi="0" rotWithShape="1">
-          <a:blip r:embed="rId2">
-            <a:lum/>
-          </a:blip>
-          <a:srcRect/>
-          <a:stretch>
-            <a:fillRect l="-4000" r="-4000"/>
-          </a:stretch>
-        </a:blipFill>
-        <a:effectsLst/>
-      </p:bgPr>
-    </p:bg>
-    <p:spTree>
-      <p:nvGrpSpPr>
-        <p:cNvPr id="1" name=""/>
-        <p:cNvGrpSpPr/>
-        <p:nvPr/>
-      </p:nvGrpSpPr>
-      <p:grpSpPr>
-        <a:xfrm>
-          <a:off x="0" y="0"/>
-          <a:ext cx="0" cy="0"/>
-          <a:chOff x="0" y="0"/>
-          <a:chExt cx="0" cy="0"/>
-        </a:xfrm>
-      </p:grpSpPr>
-      <p:sp>
-        <p:nvSpPr>
-          <p:cNvPr id="2" name="Title 1"/>
-          <p:cNvSpPr>
-            <a:spLocks noGrp="1"/>
-          </p:cNvSpPr>
-          <p:nvPr>
-            <p:ph type="title"/>
-          </p:nvPr>
-        </p:nvSpPr>
-        <p:spPr/>
-        <p:txBody>
-          <a:bodyPr/>
-          <a:lstStyle/>
-          <a:p>
-            <a:pPr lvl="0" indent="0" marL="0">
-              <a:buNone/>
-            </a:pPr>
-            <a:r>
-              <a:rPr/>
-              <a:t>Results</a:t>
-            </a:r>
-          </a:p>
-        </p:txBody>
-      </p:sp>
-      <p:sp>
-        <p:nvSpPr>
-          <p:cNvPr id="3" name="Content Placeholder 2"/>
-          <p:cNvSpPr>
-            <a:spLocks noGrp="1"/>
-          </p:cNvSpPr>
-          <p:nvPr>
-            <p:ph idx="1"/>
-          </p:nvPr>
-        </p:nvSpPr>
-        <p:spPr/>
-        <p:txBody>
-          <a:bodyPr/>
-          <a:lstStyle/>
-          <a:p>
-            <a:pPr lvl="0" indent="0" marL="0">
-              <a:spcBef>
-                <a:spcPts val="3000"/>
-              </a:spcBef>
-              <a:buNone/>
-            </a:pPr>
-            <a:r>
-              <a:rPr b="1"/>
-              <a:t>The Four Archetypes</a:t>
-            </a:r>
-          </a:p>
-          <a:p>
-            <a:pPr lvl="0" indent="-342900" marL="342900">
-              <a:buAutoNum type="arabicPeriod"/>
-            </a:pPr>
-            <a:r>
-              <a:rPr/>
-              <a:t>Broadband simple bursts (30%)</a:t>
-            </a:r>
-            <a:r>
-              <a:rPr baseline="30000">
-                <a:hlinkClick r:id="rId3" action="ppaction://hlinksldjump"/>
-              </a:rPr>
-              <a:t>2</a:t>
-            </a:r>
-          </a:p>
-          <a:p>
-            <a:pPr lvl="0" indent="-342900" marL="342900">
-              <a:buAutoNum type="arabicPeriod"/>
-            </a:pPr>
-            <a:r>
-              <a:rPr/>
-              <a:t>Narrowband simple bursts (60%)</a:t>
-            </a:r>
-          </a:p>
-          <a:p>
-            <a:pPr lvl="0" indent="-342900" marL="342900">
-              <a:buAutoNum type="arabicPeriod"/>
-            </a:pPr>
-            <a:r>
-              <a:rPr/>
-              <a:t>Complex bursts with similar frequency extent (5%)</a:t>
-            </a:r>
-          </a:p>
-          <a:p>
-            <a:pPr lvl="0" indent="-342900" marL="342900">
-              <a:buAutoNum type="arabicPeriod"/>
-            </a:pPr>
-            <a:r>
-              <a:rPr/>
-              <a:t>Complex bursts with subbursts that drift downward in frequency (5%)</a:t>
-            </a:r>
-          </a:p>
-        </p:txBody>
-      </p:sp>
-    </p:spTree>
-  </p:cSld>
-</p:sld>
-</file>
-
-<file path=ppt/slides/slide6.xml><?xml version="1.0" encoding="utf-8"?>
 <p:sld xmlns:a="http://schemas.openxmlformats.org/drawingml/2006/main" xmlns:r="http://schemas.openxmlformats.org/officeDocument/2006/relationships" xmlns:p="http://schemas.openxmlformats.org/presentationml/2006/main">
   <p:cSld>
     <p:spTree>
@@ -4720,121 +4207,14 @@
           <a:chExt cx="0" cy="0"/>
         </a:xfrm>
       </p:grpSpPr>
-      <p:pic>
-        <p:nvPicPr>
-          <p:cNvPr descr="fig:  ./figures/pleunis-archetype.jpg" id="0" name="Picture 1"/>
-          <p:cNvPicPr>
-            <a:picLocks noGrp="1" noChangeAspect="1"/>
-          </p:cNvPicPr>
-          <p:nvPr/>
-        </p:nvPicPr>
-        <p:blipFill>
-          <a:blip r:embed="rId2"/>
-          <a:stretch>
-            <a:fillRect/>
-          </a:stretch>
-        </p:blipFill>
-        <p:spPr bwMode="auto">
-          <a:xfrm>
-            <a:off x="1816100" y="1193800"/>
-            <a:ext cx="5511800" cy="2882900"/>
-          </a:xfrm>
-          <a:prstGeom prst="rect">
-            <a:avLst/>
-          </a:prstGeom>
-          <a:noFill/>
-          <a:ln w="9525">
-            <a:noFill/>
-            <a:headEnd/>
-            <a:tailEnd/>
-          </a:ln>
-        </p:spPr>
-      </p:pic>
-      <p:sp>
-        <p:nvSpPr>
-          <p:cNvPr id="1" name="TextBox 3"/>
-          <p:cNvSpPr txBox="1"/>
-          <p:nvPr/>
-        </p:nvSpPr>
-        <p:spPr>
-          <a:xfrm>
-            <a:off x="457200" y="4076700"/>
-            <a:ext cx="8229600" cy="508000"/>
-          </a:xfrm>
-          <a:prstGeom prst="rect">
-            <a:avLst/>
-          </a:prstGeom>
-          <a:noFill/>
-        </p:spPr>
-        <p:txBody>
-          <a:bodyPr/>
-          <a:lstStyle/>
-          <a:p>
-            <a:pPr lvl="0" indent="0" marL="0" algn="ctr">
-              <a:buNone/>
-            </a:pPr>
-            <a:r>
-              <a:rPr/>
-              <a:t>Figure 1: A single example of each archetype numbered accordingly.</a:t>
-            </a:r>
-          </a:p>
-        </p:txBody>
-      </p:sp>
-    </p:spTree>
-  </p:cSld>
-</p:sld>
-</file>
-
-<file path=ppt/slides/slide7.xml><?xml version="1.0" encoding="utf-8"?>
-<p:sld xmlns:a="http://schemas.openxmlformats.org/drawingml/2006/main" xmlns:r="http://schemas.openxmlformats.org/officeDocument/2006/relationships" xmlns:p="http://schemas.openxmlformats.org/presentationml/2006/main">
-  <p:cSld>
-    <p:spTree>
-      <p:nvGrpSpPr>
-        <p:cNvPr id="1" name=""/>
-        <p:cNvGrpSpPr/>
-        <p:nvPr/>
-      </p:nvGrpSpPr>
-      <p:grpSpPr>
-        <a:xfrm>
-          <a:off x="0" y="0"/>
-          <a:ext cx="0" cy="0"/>
-          <a:chOff x="0" y="0"/>
-          <a:chExt cx="0" cy="0"/>
-        </a:xfrm>
-      </p:grpSpPr>
-      <p:sp>
-        <p:nvSpPr>
-          <p:cNvPr id="2" name="Title 1"/>
-          <p:cNvSpPr>
-            <a:spLocks noGrp="1"/>
-          </p:cNvSpPr>
-          <p:nvPr>
-            <p:ph type="title"/>
-          </p:nvPr>
-        </p:nvSpPr>
-        <p:spPr/>
-        <p:txBody>
-          <a:bodyPr/>
-          <a:lstStyle/>
-          <a:p>
-            <a:pPr lvl="0" indent="0" marL="0">
-              <a:buNone/>
-            </a:pPr>
-            <a:r>
-              <a:rPr/>
-              <a:t>Implications</a:t>
-            </a:r>
-          </a:p>
-        </p:txBody>
-      </p:sp>
-      <p:sp>
-        <p:nvSpPr>
-          <p:cNvPr id="3" name="Content Placeholder 2"/>
-          <p:cNvSpPr>
-            <a:spLocks noGrp="1"/>
-          </p:cNvSpPr>
-          <p:nvPr>
-            <p:ph idx="1"/>
+      <p:sp>
+        <p:nvSpPr>
+          <p:cNvPr id="4" name="Text Placeholder 3"/>
+          <p:cNvSpPr>
+            <a:spLocks noGrp="1"/>
+          </p:cNvSpPr>
+          <p:nvPr>
+            <p:ph idx="2" sz="half" type="body"/>
           </p:nvPr>
         </p:nvSpPr>
         <p:spPr/>
@@ -4850,121 +4230,21 @@
             </a:pPr>
             <a:r>
               <a:rPr b="1"/>
-              <a:t>Repeaters vs Non-Repeaters</a:t>
-            </a:r>
-          </a:p>
-          <a:p>
-            <a:pPr lvl="0" indent="-342900" marL="342900">
-              <a:buAutoNum type="arabicPeriod"/>
-            </a:pPr>
+              <a:t>Clustering Algorithm</a:t>
+            </a:r>
+          </a:p>
+          <a:p>
+            <a:pPr lvl="0"/>
             <a:r>
               <a:rPr/>
-              <a:t>A broadband and single-peaked morphology has so far never been clearly observed in a repeater burst</a:t>
-            </a:r>
-          </a:p>
-          <a:p>
-            <a:pPr lvl="0" indent="-342900" marL="342900">
-              <a:buAutoNum type="arabicPeriod"/>
-            </a:pPr>
-            <a:r>
-              <a:rPr/>
-              <a:t>There is a lot of downward-drifting subbursts among repeater bursts</a:t>
-            </a:r>
-          </a:p>
-          <a:p>
-            <a:pPr lvl="1" indent="0" marL="342900">
-              <a:buNone/>
-            </a:pPr>
-            <a:r>
-              <a:rPr/>
-              <a:t>(19/58 bursts among 13/19 sources)</a:t>
-            </a:r>
-          </a:p>
-        </p:txBody>
-      </p:sp>
-    </p:spTree>
-  </p:cSld>
-</p:sld>
-</file>
-
-<file path=ppt/slides/slide8.xml><?xml version="1.0" encoding="utf-8"?>
-<p:sld xmlns:a="http://schemas.openxmlformats.org/drawingml/2006/main" xmlns:r="http://schemas.openxmlformats.org/officeDocument/2006/relationships" xmlns:p="http://schemas.openxmlformats.org/presentationml/2006/main">
-  <p:cSld>
-    <p:spTree>
-      <p:nvGrpSpPr>
-        <p:cNvPr id="1" name=""/>
-        <p:cNvGrpSpPr/>
-        <p:nvPr/>
-      </p:nvGrpSpPr>
-      <p:grpSpPr>
-        <a:xfrm>
-          <a:off x="0" y="0"/>
-          <a:ext cx="0" cy="0"/>
-          <a:chOff x="0" y="0"/>
-          <a:chExt cx="0" cy="0"/>
-        </a:xfrm>
-      </p:grpSpPr>
-      <p:sp>
-        <p:nvSpPr>
-          <p:cNvPr id="2" name="Title 1"/>
-          <p:cNvSpPr>
-            <a:spLocks noGrp="1"/>
-          </p:cNvSpPr>
-          <p:nvPr>
-            <p:ph type="title"/>
-          </p:nvPr>
-        </p:nvSpPr>
-        <p:spPr>
-          <a:xfrm>
-            <a:off x="457201" y="204787"/>
-            <a:ext cx="3008313" cy="871538"/>
-          </a:xfrm>
-        </p:spPr>
-        <p:txBody>
-          <a:bodyPr/>
-          <a:lstStyle/>
-          <a:p>
-            <a:pPr lvl="0" indent="0" marL="0">
-              <a:buNone/>
-            </a:pPr>
-            <a:r>
-              <a:rPr/>
-              <a:t>Implications</a:t>
-            </a:r>
-          </a:p>
-        </p:txBody>
-      </p:sp>
-      <p:sp>
-        <p:nvSpPr>
-          <p:cNvPr id="4" name="Text Placeholder 3"/>
-          <p:cNvSpPr>
-            <a:spLocks noGrp="1"/>
-          </p:cNvSpPr>
-          <p:nvPr>
-            <p:ph idx="2" sz="half" type="body"/>
-          </p:nvPr>
-        </p:nvSpPr>
-        <p:spPr/>
-        <p:txBody>
-          <a:bodyPr/>
-          <a:lstStyle/>
-          <a:p>
-            <a:pPr lvl="0" indent="0" marL="0">
-              <a:spcBef>
-                <a:spcPts val="3000"/>
-              </a:spcBef>
-              <a:buNone/>
-            </a:pPr>
-            <a:r>
-              <a:rPr b="1"/>
-              <a:t>Repeaters vs Non-Repeaters</a:t>
+              <a:t>DBSCAN is a clustering algorithm whose number of clusters are entirely based on the shape of the data.</a:t>
             </a:r>
           </a:p>
         </p:txBody>
       </p:sp>
       <p:pic>
         <p:nvPicPr>
-          <p:cNvPr descr="fig:  ./figures/pleunis-bandwidth.jpg" id="0" name="Picture 1"/>
+          <p:cNvPr descr="./figures/dbscan-vs-kmeans.png" id="0" name="Picture 1"/>
           <p:cNvPicPr>
             <a:picLocks noGrp="1" noChangeAspect="1"/>
           </p:cNvPicPr>
@@ -5017,11 +4297,408 @@
             </a:pPr>
             <a:r>
               <a:rPr/>
-              <a:t>Figure 2: Bandwidths and durations of the FRBs in Catalog 1 with normalized histograms on the sides.</a:t>
-            </a:r>
-          </a:p>
-        </p:txBody>
-      </p:sp>
+              <a:t>Comparison with another clustering algorithm, taken from </a:t>
+            </a:r>
+            <a:r>
+              <a:rPr>
+                <a:hlinkClick r:id="rId3"/>
+              </a:rPr>
+              <a:t>https://github.com/NSHipster/DBSCAN</a:t>
+            </a:r>
+          </a:p>
+        </p:txBody>
+      </p:sp>
+    </p:spTree>
+  </p:cSld>
+</p:sld>
+</file>
+
+<file path=ppt/slides/slide6.xml><?xml version="1.0" encoding="utf-8"?>
+<p:sld xmlns:a="http://schemas.openxmlformats.org/drawingml/2006/main" xmlns:r="http://schemas.openxmlformats.org/officeDocument/2006/relationships" xmlns:p="http://schemas.openxmlformats.org/presentationml/2006/main">
+  <p:cSld>
+    <p:spTree>
+      <p:nvGrpSpPr>
+        <p:cNvPr id="1" name=""/>
+        <p:cNvGrpSpPr/>
+        <p:nvPr/>
+      </p:nvGrpSpPr>
+      <p:grpSpPr>
+        <a:xfrm>
+          <a:off x="0" y="0"/>
+          <a:ext cx="0" cy="0"/>
+          <a:chOff x="0" y="0"/>
+          <a:chExt cx="0" cy="0"/>
+        </a:xfrm>
+      </p:grpSpPr>
+      <p:sp>
+        <p:nvSpPr>
+          <p:cNvPr id="2" name="Title 1"/>
+          <p:cNvSpPr>
+            <a:spLocks noGrp="1"/>
+          </p:cNvSpPr>
+          <p:nvPr>
+            <p:ph type="title"/>
+          </p:nvPr>
+        </p:nvSpPr>
+        <p:spPr/>
+        <p:txBody>
+          <a:bodyPr/>
+          <a:lstStyle/>
+          <a:p>
+            <a:pPr lvl="0" indent="0" marL="0">
+              <a:buNone/>
+            </a:pPr>
+            <a:r>
+              <a:rPr/>
+              <a:t>Method: Identifying Repeaters</a:t>
+            </a:r>
+          </a:p>
+        </p:txBody>
+      </p:sp>
+      <mc:AlternateContent xmlns:mc="http://schemas.openxmlformats.org/markup-compatibility/2006">
+        <mc:Choice xmlns:a14="http://schemas.microsoft.com/office/drawing/2010/main" Requires="a14">
+          <p:sp>
+            <p:nvSpPr>
+              <p:cNvPr id="3" name="Content Placeholder 2"/>
+              <p:cNvSpPr>
+                <a:spLocks noGrp="1"/>
+              </p:cNvSpPr>
+              <p:nvPr>
+                <p:ph idx="1"/>
+              </p:nvPr>
+            </p:nvSpPr>
+            <p:spPr/>
+            <p:txBody>
+              <a:bodyPr/>
+              <a:lstStyle/>
+              <a:p>
+                <a:pPr lvl="0" indent="0" marL="0">
+                  <a:spcBef>
+                    <a:spcPts val="3000"/>
+                  </a:spcBef>
+                  <a:buNone/>
+                </a:pPr>
+                <a:r>
+                  <a:rPr b="1"/>
+                  <a:t>Contamination Rate</a:t>
+                </a:r>
+              </a:p>
+              <a:p>
+                <a:pPr lvl="0"/>
+                <a:r>
+                  <a:rPr/>
+                  <a:t>For each cluster, they calculate the probability of detecting additional </a:t>
+                </a:r>
+                <a14:m>
+                  <m:oMath xmlns:m="http://schemas.openxmlformats.org/officeDocument/2006/math">
+                    <m:r>
+                      <m:t>x</m:t>
+                    </m:r>
+                    <m:r>
+                      <m:rPr>
+                        <m:sty m:val="p"/>
+                      </m:rPr>
+                      <m:t>−</m:t>
+                    </m:r>
+                    <m:r>
+                      <m:t>1</m:t>
+                    </m:r>
+                  </m:oMath>
+                </a14:m>
+                <a:r>
+                  <a:rPr/>
+                  <a:t> coincident bursts that are physically unrelated.</a:t>
+                </a:r>
+              </a:p>
+              <a:p>
+                <a:pPr lvl="0"/>
+                <a:r>
+                  <a:rPr/>
+                  <a:t>This probability of a coincident burst is a binomial distribution (either coincident, or non-coincident).</a:t>
+                </a:r>
+              </a:p>
+              <a:p>
+                <a:pPr lvl="0"/>
+                <a:r>
+                  <a:rPr/>
+                  <a:t>The contamination rate, </a:t>
+                </a:r>
+                <a14:m>
+                  <m:oMath xmlns:m="http://schemas.openxmlformats.org/officeDocument/2006/math">
+                    <m:sSub>
+                      <m:e>
+                        <m:r>
+                          <m:t>R</m:t>
+                        </m:r>
+                      </m:e>
+                      <m:sub>
+                        <m:r>
+                          <m:t>c</m:t>
+                        </m:r>
+                        <m:r>
+                          <m:t>c</m:t>
+                        </m:r>
+                      </m:sub>
+                    </m:sSub>
+                  </m:oMath>
+                </a14:m>
+                <a:r>
+                  <a:rPr/>
+                  <a:t>, is then equals to this probability multiplied by the number of total detections, </a:t>
+                </a:r>
+                <a14:m>
+                  <m:oMath xmlns:m="http://schemas.openxmlformats.org/officeDocument/2006/math">
+                    <m:r>
+                      <m:t>N</m:t>
+                    </m:r>
+                    <m:r>
+                      <m:rPr>
+                        <m:sty m:val="p"/>
+                      </m:rPr>
+                      <m:t>=</m:t>
+                    </m:r>
+                    <m:r>
+                      <m:t>2197</m:t>
+                    </m:r>
+                  </m:oMath>
+                </a14:m>
+                <a:r>
+                  <a:rPr/>
+                  <a:t>.</a:t>
+                </a:r>
+              </a:p>
+            </p:txBody>
+          </p:sp>
+        </mc:Choice>
+      </mc:AlternateContent>
+    </p:spTree>
+  </p:cSld>
+</p:sld>
+</file>
+
+<file path=ppt/slides/slide7.xml><?xml version="1.0" encoding="utf-8"?>
+<p:sld xmlns:a="http://schemas.openxmlformats.org/drawingml/2006/main" xmlns:r="http://schemas.openxmlformats.org/officeDocument/2006/relationships" xmlns:p="http://schemas.openxmlformats.org/presentationml/2006/main">
+  <p:cSld>
+    <p:spTree>
+      <p:nvGrpSpPr>
+        <p:cNvPr id="1" name=""/>
+        <p:cNvGrpSpPr/>
+        <p:nvPr/>
+      </p:nvGrpSpPr>
+      <p:grpSpPr>
+        <a:xfrm>
+          <a:off x="0" y="0"/>
+          <a:ext cx="0" cy="0"/>
+          <a:chOff x="0" y="0"/>
+          <a:chExt cx="0" cy="0"/>
+        </a:xfrm>
+      </p:grpSpPr>
+      <p:sp>
+        <p:nvSpPr>
+          <p:cNvPr id="4" name="Text Placeholder 3"/>
+          <p:cNvSpPr>
+            <a:spLocks noGrp="1"/>
+          </p:cNvSpPr>
+          <p:nvPr>
+            <p:ph idx="2" sz="half" type="body"/>
+          </p:nvPr>
+        </p:nvSpPr>
+        <p:spPr/>
+        <p:txBody>
+          <a:bodyPr/>
+          <a:lstStyle/>
+          <a:p>
+            <a:pPr lvl="0" indent="0" marL="0">
+              <a:spcBef>
+                <a:spcPts val="3000"/>
+              </a:spcBef>
+              <a:buNone/>
+            </a:pPr>
+            <a:r>
+              <a:rPr b="1"/>
+              <a:t>Contamination Rate</a:t>
+            </a:r>
+          </a:p>
+        </p:txBody>
+      </p:sp>
+      <p:pic>
+        <p:nvPicPr>
+          <p:cNvPr descr="./figures/contamination-rate.png" id="0" name="Picture 1"/>
+          <p:cNvPicPr>
+            <a:picLocks noGrp="1" noChangeAspect="1"/>
+          </p:cNvPicPr>
+          <p:nvPr/>
+        </p:nvPicPr>
+        <p:blipFill>
+          <a:blip r:embed="rId2"/>
+          <a:stretch>
+            <a:fillRect/>
+          </a:stretch>
+        </p:blipFill>
+        <p:spPr bwMode="auto">
+          <a:xfrm>
+            <a:off x="3568700" y="1079500"/>
+            <a:ext cx="5105400" cy="2628900"/>
+          </a:xfrm>
+          <a:prstGeom prst="rect">
+            <a:avLst/>
+          </a:prstGeom>
+          <a:noFill/>
+          <a:ln w="9525">
+            <a:noFill/>
+            <a:headEnd/>
+            <a:tailEnd/>
+          </a:ln>
+        </p:spPr>
+      </p:pic>
+    </p:spTree>
+  </p:cSld>
+</p:sld>
+</file>
+
+<file path=ppt/slides/slide8.xml><?xml version="1.0" encoding="utf-8"?>
+<p:sld xmlns:a="http://schemas.openxmlformats.org/drawingml/2006/main" xmlns:r="http://schemas.openxmlformats.org/officeDocument/2006/relationships" xmlns:p="http://schemas.openxmlformats.org/presentationml/2006/main">
+  <p:cSld>
+    <p:spTree>
+      <p:nvGrpSpPr>
+        <p:cNvPr id="1" name=""/>
+        <p:cNvGrpSpPr/>
+        <p:nvPr/>
+      </p:nvGrpSpPr>
+      <p:grpSpPr>
+        <a:xfrm>
+          <a:off x="0" y="0"/>
+          <a:ext cx="0" cy="0"/>
+          <a:chOff x="0" y="0"/>
+          <a:chExt cx="0" cy="0"/>
+        </a:xfrm>
+      </p:grpSpPr>
+      <mc:AlternateContent xmlns:mc="http://schemas.openxmlformats.org/markup-compatibility/2006">
+        <mc:Choice xmlns:a14="http://schemas.microsoft.com/office/drawing/2010/main" Requires="a14">
+          <p:sp>
+            <p:nvSpPr>
+              <p:cNvPr id="3" name="Content Placeholder 2"/>
+              <p:cNvSpPr>
+                <a:spLocks noGrp="1"/>
+              </p:cNvSpPr>
+              <p:nvPr>
+                <p:ph idx="1"/>
+              </p:nvPr>
+            </p:nvSpPr>
+            <p:spPr/>
+            <p:txBody>
+              <a:bodyPr/>
+              <a:lstStyle/>
+              <a:p>
+                <a:pPr lvl="0" indent="0" marL="0">
+                  <a:spcBef>
+                    <a:spcPts val="3000"/>
+                  </a:spcBef>
+                  <a:buNone/>
+                </a:pPr>
+                <a:r>
+                  <a:rPr b="1"/>
+                  <a:t>Contamination Rate</a:t>
+                </a:r>
+              </a:p>
+              <a:p>
+                <a:pPr lvl="0"/>
+                <a:r>
+                  <a:rPr/>
+                  <a:t>“Gold” sample (32 sources): A source with </a:t>
+                </a:r>
+                <a14:m>
+                  <m:oMath xmlns:m="http://schemas.openxmlformats.org/officeDocument/2006/math">
+                    <m:sSub>
+                      <m:e>
+                        <m:r>
+                          <m:t>R</m:t>
+                        </m:r>
+                      </m:e>
+                      <m:sub>
+                        <m:r>
+                          <m:t>c</m:t>
+                        </m:r>
+                        <m:r>
+                          <m:t>c</m:t>
+                        </m:r>
+                      </m:sub>
+                    </m:sSub>
+                    <m:r>
+                      <m:rPr>
+                        <m:sty m:val="p"/>
+                      </m:rPr>
+                      <m:t>&lt;</m:t>
+                    </m:r>
+                    <m:r>
+                      <m:t>0.5</m:t>
+                    </m:r>
+                  </m:oMath>
+                </a14:m>
+                <a:r>
+                  <a:rPr/>
+                  <a:t> is deemed as a real repeating sources of FRBs, such that there is less than 50% probability that one source in the sample got included by chance.</a:t>
+                </a:r>
+              </a:p>
+              <a:p>
+                <a:pPr lvl="0"/>
+                <a:r>
+                  <a:rPr/>
+                  <a:t>“Silver” sample (18 sources): A source with </a:t>
+                </a:r>
+                <a14:m>
+                  <m:oMath xmlns:m="http://schemas.openxmlformats.org/officeDocument/2006/math">
+                    <m:r>
+                      <m:t>0.5</m:t>
+                    </m:r>
+                    <m:r>
+                      <m:rPr>
+                        <m:sty m:val="p"/>
+                      </m:rPr>
+                      <m:t>≤</m:t>
+                    </m:r>
+                    <m:sSub>
+                      <m:e>
+                        <m:r>
+                          <m:t>R</m:t>
+                        </m:r>
+                      </m:e>
+                      <m:sub>
+                        <m:r>
+                          <m:t>c</m:t>
+                        </m:r>
+                        <m:r>
+                          <m:t>c</m:t>
+                        </m:r>
+                      </m:sub>
+                    </m:sSub>
+                    <m:r>
+                      <m:rPr>
+                        <m:sty m:val="p"/>
+                      </m:rPr>
+                      <m:t>&lt;</m:t>
+                    </m:r>
+                    <m:r>
+                      <m:t>5</m:t>
+                    </m:r>
+                  </m:oMath>
+                </a14:m>
+                <a:r>
+                  <a:rPr/>
+                  <a:t> is a candidate repeater and warrants follow up observation.</a:t>
+                </a:r>
+              </a:p>
+              <a:p>
+                <a:pPr lvl="0"/>
+                <a:r>
+                  <a:rPr/>
+                  <a:t>Excluding those with inconsistent localizations, we arrive at 25 gold samples and 14 silver samples.</a:t>
+                </a:r>
+              </a:p>
+            </p:txBody>
+          </p:sp>
+        </mc:Choice>
+      </mc:AlternateContent>
     </p:spTree>
   </p:cSld>
 </p:sld>
@@ -5044,82 +4721,24 @@
           <a:chExt cx="0" cy="0"/>
         </a:xfrm>
       </p:grpSpPr>
-      <p:sp>
-        <p:nvSpPr>
-          <p:cNvPr id="2" name="Title 1"/>
-          <p:cNvSpPr>
-            <a:spLocks noGrp="1"/>
-          </p:cNvSpPr>
-          <p:nvPr>
-            <p:ph type="title"/>
-          </p:nvPr>
-        </p:nvSpPr>
-        <p:spPr>
-          <a:xfrm>
-            <a:off x="457201" y="204787"/>
-            <a:ext cx="3008313" cy="871538"/>
-          </a:xfrm>
-        </p:spPr>
-        <p:txBody>
-          <a:bodyPr/>
-          <a:lstStyle/>
-          <a:p>
-            <a:pPr lvl="0" indent="0" marL="0">
-              <a:buNone/>
-            </a:pPr>
-            <a:r>
-              <a:rPr/>
-              <a:t>Implications</a:t>
-            </a:r>
-          </a:p>
-        </p:txBody>
-      </p:sp>
-      <p:sp>
-        <p:nvSpPr>
-          <p:cNvPr id="4" name="Text Placeholder 3"/>
-          <p:cNvSpPr>
-            <a:spLocks noGrp="1"/>
-          </p:cNvSpPr>
-          <p:nvPr>
-            <p:ph idx="2" sz="half" type="body"/>
-          </p:nvPr>
-        </p:nvSpPr>
-        <p:spPr/>
-        <p:txBody>
-          <a:bodyPr/>
-          <a:lstStyle/>
-          <a:p>
-            <a:pPr lvl="0" indent="0" marL="0">
-              <a:spcBef>
-                <a:spcPts val="3000"/>
-              </a:spcBef>
-              <a:buNone/>
-            </a:pPr>
-            <a:r>
-              <a:rPr b="1"/>
-              <a:t>Subburst Separation</a:t>
-            </a:r>
-          </a:p>
-        </p:txBody>
-      </p:sp>
       <p:pic>
         <p:nvPicPr>
-          <p:cNvPr descr="fig:  ./figures/pleunis-separation.jpg" id="0" name="Picture 1"/>
+          <p:cNvPr descr="./figures/detection-timelines.png" id="0" name="Picture 1"/>
           <p:cNvPicPr>
             <a:picLocks noGrp="1" noChangeAspect="1"/>
           </p:cNvPicPr>
           <p:nvPr/>
         </p:nvPicPr>
         <p:blipFill>
-          <a:blip r:embed="rId3"/>
+          <a:blip r:embed="rId2"/>
           <a:stretch>
             <a:fillRect/>
           </a:stretch>
         </p:blipFill>
         <p:spPr bwMode="auto">
           <a:xfrm>
-            <a:off x="4089400" y="203200"/>
-            <a:ext cx="4064000" cy="3873500"/>
+            <a:off x="2667000" y="1193800"/>
+            <a:ext cx="3822700" cy="3390900"/>
           </a:xfrm>
           <a:prstGeom prst="rect">
             <a:avLst/>
@@ -5132,36 +4751,6 @@
           </a:ln>
         </p:spPr>
       </p:pic>
-      <p:sp>
-        <p:nvSpPr>
-          <p:cNvPr id="1" name="TextBox 3"/>
-          <p:cNvSpPr txBox="1"/>
-          <p:nvPr/>
-        </p:nvSpPr>
-        <p:spPr>
-          <a:xfrm>
-            <a:off x="3568700" y="4076700"/>
-            <a:ext cx="5105400" cy="508000"/>
-          </a:xfrm>
-          <a:prstGeom prst="rect">
-            <a:avLst/>
-          </a:prstGeom>
-          <a:noFill/>
-        </p:spPr>
-        <p:txBody>
-          <a:bodyPr/>
-          <a:lstStyle/>
-          <a:p>
-            <a:pPr lvl="0" indent="0" marL="0" algn="ctr">
-              <a:buNone/>
-            </a:pPr>
-            <a:r>
-              <a:rPr/>
-              <a:t>Figure 3: Subburst separations in time and frequency in Catalog 1 with bursts from apparent nonrepeaters (green diamonds) and repeater bursts (orange and yellow open circles). Note that only FRBs that have two or more subbursts are included. Of the 18 repeater bursts, 8 are from FRB 20180916B. Those 8 have been colored yellow in the central panel to avoid biasing the interpretation.</a:t>
-            </a:r>
-          </a:p>
-        </p:txBody>
-      </p:sp>
     </p:spTree>
   </p:cSld>
 </p:sld>

</xml_diff>